<commit_message>
updated documentation and technical docs folders
</commit_message>
<xml_diff>
--- a/test_case/test_case_summary.pptx
+++ b/test_case/test_case_summary.pptx
@@ -6,6 +6,8 @@
   </p:sldMasterIdLst>
   <p:sldIdLst>
     <p:sldId id="257" r:id="rId2"/>
+    <p:sldId id="258" r:id="rId3"/>
+    <p:sldId id="259" r:id="rId4"/>
   </p:sldIdLst>
   <p:sldSz cx="12192000" cy="6858000"/>
   <p:notesSz cx="6858000" cy="9144000"/>
@@ -104,6 +106,11 @@
       </a:defRPr>
     </a:lvl9pPr>
   </p:defaultTextStyle>
+  <p:extLst>
+    <p:ext uri="{EFAFB233-063F-42B5-8137-9DF3F51BA10A}">
+      <p15:sldGuideLst xmlns:p15="http://schemas.microsoft.com/office/powerpoint/2012/main"/>
+    </p:ext>
+  </p:extLst>
 </p:presentation>
 </file>
 
@@ -835,89 +842,49 @@
           </a:p>
         </p:txBody>
       </p:sp>
-      <p:sp>
-        <p:nvSpPr>
-          <p:cNvPr id="4" name="Date Placeholder 3">
-            <a:extLst>
-              <a:ext uri="{FF2B5EF4-FFF2-40B4-BE49-F238E27FC236}">
-                <a16:creationId xmlns:a16="http://schemas.microsoft.com/office/drawing/2014/main" id="{2000CD7B-6D7C-5C47-BB88-B926F69C4D67}"/>
-              </a:ext>
-            </a:extLst>
-          </p:cNvPr>
-          <p:cNvSpPr>
-            <a:spLocks noGrp="1"/>
-          </p:cNvSpPr>
-          <p:nvPr>
-            <p:ph type="dt" sz="half" idx="10"/>
-          </p:nvPr>
-        </p:nvSpPr>
-        <p:spPr/>
-        <p:txBody>
-          <a:bodyPr/>
-          <a:lstStyle/>
-          <a:p>
-            <a:fld id="{4260753E-2AF7-5442-8B3D-28F319FCB303}" type="datetimeFigureOut">
-              <a:rPr lang="en-US" smtClean="0"/>
-              <a:t>1/29/19</a:t>
-            </a:fld>
-            <a:endParaRPr lang="en-US"/>
-          </a:p>
-        </p:txBody>
-      </p:sp>
-      <p:sp>
-        <p:nvSpPr>
-          <p:cNvPr id="5" name="Footer Placeholder 4">
-            <a:extLst>
-              <a:ext uri="{FF2B5EF4-FFF2-40B4-BE49-F238E27FC236}">
-                <a16:creationId xmlns:a16="http://schemas.microsoft.com/office/drawing/2014/main" id="{9E3CFA92-DBC1-974F-A2DE-536AE211798C}"/>
-              </a:ext>
-            </a:extLst>
-          </p:cNvPr>
-          <p:cNvSpPr>
-            <a:spLocks noGrp="1"/>
-          </p:cNvSpPr>
-          <p:nvPr>
-            <p:ph type="ftr" sz="quarter" idx="11"/>
-          </p:nvPr>
-        </p:nvSpPr>
-        <p:spPr/>
-        <p:txBody>
-          <a:bodyPr/>
-          <a:lstStyle/>
-          <a:p>
-            <a:endParaRPr lang="en-US"/>
-          </a:p>
-        </p:txBody>
-      </p:sp>
-      <p:sp>
-        <p:nvSpPr>
-          <p:cNvPr id="6" name="Slide Number Placeholder 5">
-            <a:extLst>
-              <a:ext uri="{FF2B5EF4-FFF2-40B4-BE49-F238E27FC236}">
-                <a16:creationId xmlns:a16="http://schemas.microsoft.com/office/drawing/2014/main" id="{CB9A284E-D769-CE4E-88CB-99227DC331AF}"/>
-              </a:ext>
-            </a:extLst>
-          </p:cNvPr>
-          <p:cNvSpPr>
-            <a:spLocks noGrp="1"/>
-          </p:cNvSpPr>
-          <p:nvPr>
-            <p:ph type="sldNum" sz="quarter" idx="12"/>
-          </p:nvPr>
-        </p:nvSpPr>
-        <p:spPr/>
-        <p:txBody>
-          <a:bodyPr/>
-          <a:lstStyle/>
-          <a:p>
-            <a:fld id="{250A384F-9E63-B843-8D2E-80771F216676}" type="slidenum">
-              <a:rPr lang="en-US" smtClean="0"/>
-              <a:t>‹#›</a:t>
-            </a:fld>
-            <a:endParaRPr lang="en-US"/>
-          </a:p>
-        </p:txBody>
-      </p:sp>
+      <p:cxnSp>
+        <p:nvCxnSpPr>
+          <p:cNvPr id="8" name="Straight Connector 7">
+            <a:extLst>
+              <a:ext uri="{FF2B5EF4-FFF2-40B4-BE49-F238E27FC236}">
+                <a16:creationId xmlns:a16="http://schemas.microsoft.com/office/drawing/2014/main" id="{276BD129-139D-F84B-AEBA-17E0EFEA8B0E}"/>
+              </a:ext>
+            </a:extLst>
+          </p:cNvPr>
+          <p:cNvCxnSpPr>
+            <a:cxnSpLocks/>
+          </p:cNvCxnSpPr>
+          <p:nvPr userDrawn="1"/>
+        </p:nvCxnSpPr>
+        <p:spPr>
+          <a:xfrm>
+            <a:off x="2121877" y="6541477"/>
+            <a:ext cx="9231923" cy="0"/>
+          </a:xfrm>
+          <a:prstGeom prst="line">
+            <a:avLst/>
+          </a:prstGeom>
+          <a:ln w="38100">
+            <a:solidFill>
+              <a:schemeClr val="accent1"/>
+            </a:solidFill>
+          </a:ln>
+        </p:spPr>
+        <p:style>
+          <a:lnRef idx="1">
+            <a:schemeClr val="accent1"/>
+          </a:lnRef>
+          <a:fillRef idx="0">
+            <a:schemeClr val="accent1"/>
+          </a:fillRef>
+          <a:effectRef idx="0">
+            <a:schemeClr val="accent1"/>
+          </a:effectRef>
+          <a:fontRef idx="minor">
+            <a:schemeClr val="tx1"/>
+          </a:fontRef>
+        </p:style>
+      </p:cxnSp>
     </p:spTree>
     <p:extLst>
       <p:ext uri="{BB962C8B-B14F-4D97-AF65-F5344CB8AC3E}">
@@ -3454,94 +3421,115 @@
           </a:prstGeom>
         </p:spPr>
       </p:pic>
-      <p:sp>
-        <p:nvSpPr>
-          <p:cNvPr id="10" name="TextBox 9">
-            <a:extLst>
-              <a:ext uri="{FF2B5EF4-FFF2-40B4-BE49-F238E27FC236}">
-                <a16:creationId xmlns:a16="http://schemas.microsoft.com/office/drawing/2014/main" id="{C08215AE-107D-6E46-ACD9-AF53A2750D66}"/>
-              </a:ext>
-            </a:extLst>
-          </p:cNvPr>
-          <p:cNvSpPr txBox="1"/>
+      <p:grpSp>
+        <p:nvGrpSpPr>
+          <p:cNvPr id="2" name="Group 1">
+            <a:extLst>
+              <a:ext uri="{FF2B5EF4-FFF2-40B4-BE49-F238E27FC236}">
+                <a16:creationId xmlns:a16="http://schemas.microsoft.com/office/drawing/2014/main" id="{729261BE-9668-F941-80E6-3B93CC0E6BD4}"/>
+              </a:ext>
+            </a:extLst>
+          </p:cNvPr>
+          <p:cNvGrpSpPr/>
           <p:nvPr/>
-        </p:nvSpPr>
-        <p:spPr>
+        </p:nvGrpSpPr>
+        <p:grpSpPr>
           <a:xfrm>
-            <a:off x="6904094" y="4809595"/>
-            <a:ext cx="1160895" cy="307777"/>
+            <a:off x="6904094" y="4653045"/>
+            <a:ext cx="1160895" cy="464327"/>
+            <a:chOff x="6904094" y="4653045"/>
+            <a:chExt cx="1160895" cy="464327"/>
           </a:xfrm>
-          <a:prstGeom prst="rect">
-            <a:avLst/>
-          </a:prstGeom>
-          <a:noFill/>
-        </p:spPr>
-        <p:txBody>
-          <a:bodyPr wrap="none" rtlCol="0">
-            <a:spAutoFit/>
-          </a:bodyPr>
-          <a:lstStyle/>
-          <a:p>
-            <a:r>
-              <a:rPr lang="en-US" sz="1400" b="1" dirty="0">
-                <a:latin typeface="Arial" panose="020B0604020202020204" pitchFamily="34" charset="0"/>
-                <a:cs typeface="Arial" panose="020B0604020202020204" pitchFamily="34" charset="0"/>
-              </a:rPr>
-              <a:t>SEQ170844</a:t>
-            </a:r>
-          </a:p>
-        </p:txBody>
-      </p:sp>
-      <p:sp>
-        <p:nvSpPr>
-          <p:cNvPr id="11" name="Oval 10">
-            <a:extLst>
-              <a:ext uri="{FF2B5EF4-FFF2-40B4-BE49-F238E27FC236}">
-                <a16:creationId xmlns:a16="http://schemas.microsoft.com/office/drawing/2014/main" id="{CF1245D6-2984-7545-A606-4A391CBB0BBC}"/>
-              </a:ext>
-            </a:extLst>
-          </p:cNvPr>
-          <p:cNvSpPr/>
-          <p:nvPr/>
-        </p:nvSpPr>
-        <p:spPr>
-          <a:xfrm>
-            <a:off x="7384334" y="4653045"/>
-            <a:ext cx="100208" cy="100208"/>
-          </a:xfrm>
-          <a:prstGeom prst="ellipse">
-            <a:avLst/>
-          </a:prstGeom>
-        </p:spPr>
-        <p:style>
-          <a:lnRef idx="2">
-            <a:schemeClr val="dk1">
-              <a:shade val="50000"/>
-            </a:schemeClr>
-          </a:lnRef>
-          <a:fillRef idx="1">
-            <a:schemeClr val="dk1"/>
-          </a:fillRef>
-          <a:effectRef idx="0">
-            <a:schemeClr val="dk1"/>
-          </a:effectRef>
-          <a:fontRef idx="minor">
-            <a:schemeClr val="lt1"/>
-          </a:fontRef>
-        </p:style>
-        <p:txBody>
-          <a:bodyPr rtlCol="0" anchor="ctr"/>
-          <a:lstStyle/>
-          <a:p>
-            <a:pPr algn="ctr"/>
-            <a:endParaRPr lang="en-US">
-              <a:solidFill>
-                <a:sysClr val="windowText" lastClr="000000"/>
-              </a:solidFill>
-            </a:endParaRPr>
-          </a:p>
-        </p:txBody>
-      </p:sp>
+        </p:grpSpPr>
+        <p:sp>
+          <p:nvSpPr>
+            <p:cNvPr id="10" name="TextBox 9">
+              <a:extLst>
+                <a:ext uri="{FF2B5EF4-FFF2-40B4-BE49-F238E27FC236}">
+                  <a16:creationId xmlns:a16="http://schemas.microsoft.com/office/drawing/2014/main" id="{C08215AE-107D-6E46-ACD9-AF53A2750D66}"/>
+                </a:ext>
+              </a:extLst>
+            </p:cNvPr>
+            <p:cNvSpPr txBox="1"/>
+            <p:nvPr/>
+          </p:nvSpPr>
+          <p:spPr>
+            <a:xfrm>
+              <a:off x="6904094" y="4809595"/>
+              <a:ext cx="1160895" cy="307777"/>
+            </a:xfrm>
+            <a:prstGeom prst="rect">
+              <a:avLst/>
+            </a:prstGeom>
+            <a:noFill/>
+          </p:spPr>
+          <p:txBody>
+            <a:bodyPr wrap="none" rtlCol="0">
+              <a:spAutoFit/>
+            </a:bodyPr>
+            <a:lstStyle/>
+            <a:p>
+              <a:r>
+                <a:rPr lang="en-US" sz="1400" b="1" dirty="0">
+                  <a:latin typeface="Arial" panose="020B0604020202020204" pitchFamily="34" charset="0"/>
+                  <a:cs typeface="Arial" panose="020B0604020202020204" pitchFamily="34" charset="0"/>
+                </a:rPr>
+                <a:t>SEQ170844</a:t>
+              </a:r>
+            </a:p>
+          </p:txBody>
+        </p:sp>
+        <p:sp>
+          <p:nvSpPr>
+            <p:cNvPr id="11" name="Oval 10">
+              <a:extLst>
+                <a:ext uri="{FF2B5EF4-FFF2-40B4-BE49-F238E27FC236}">
+                  <a16:creationId xmlns:a16="http://schemas.microsoft.com/office/drawing/2014/main" id="{CF1245D6-2984-7545-A606-4A391CBB0BBC}"/>
+                </a:ext>
+              </a:extLst>
+            </p:cNvPr>
+            <p:cNvSpPr/>
+            <p:nvPr/>
+          </p:nvSpPr>
+          <p:spPr>
+            <a:xfrm>
+              <a:off x="7384334" y="4653045"/>
+              <a:ext cx="100208" cy="100208"/>
+            </a:xfrm>
+            <a:prstGeom prst="ellipse">
+              <a:avLst/>
+            </a:prstGeom>
+          </p:spPr>
+          <p:style>
+            <a:lnRef idx="2">
+              <a:schemeClr val="dk1">
+                <a:shade val="50000"/>
+              </a:schemeClr>
+            </a:lnRef>
+            <a:fillRef idx="1">
+              <a:schemeClr val="dk1"/>
+            </a:fillRef>
+            <a:effectRef idx="0">
+              <a:schemeClr val="dk1"/>
+            </a:effectRef>
+            <a:fontRef idx="minor">
+              <a:schemeClr val="lt1"/>
+            </a:fontRef>
+          </p:style>
+          <p:txBody>
+            <a:bodyPr rtlCol="0" anchor="ctr"/>
+            <a:lstStyle/>
+            <a:p>
+              <a:pPr algn="ctr"/>
+              <a:endParaRPr lang="en-US">
+                <a:solidFill>
+                  <a:sysClr val="windowText" lastClr="000000"/>
+                </a:solidFill>
+              </a:endParaRPr>
+            </a:p>
+          </p:txBody>
+        </p:sp>
+      </p:grpSp>
       <p:sp>
         <p:nvSpPr>
           <p:cNvPr id="12" name="TextBox 11">
@@ -3626,6 +3614,597 @@
     <p:extLst>
       <p:ext uri="{BB962C8B-B14F-4D97-AF65-F5344CB8AC3E}">
         <p14:creationId xmlns:p14="http://schemas.microsoft.com/office/powerpoint/2010/main" val="2805483132"/>
+      </p:ext>
+    </p:extLst>
+  </p:cSld>
+  <p:clrMapOvr>
+    <a:masterClrMapping/>
+  </p:clrMapOvr>
+</p:sld>
+</file>
+
+<file path=ppt/slides/slide2.xml><?xml version="1.0" encoding="utf-8"?>
+<p:sld xmlns:a="http://schemas.openxmlformats.org/drawingml/2006/main" xmlns:r="http://schemas.openxmlformats.org/officeDocument/2006/relationships" xmlns:p="http://schemas.openxmlformats.org/presentationml/2006/main">
+  <p:cSld>
+    <p:spTree>
+      <p:nvGrpSpPr>
+        <p:cNvPr id="1" name=""/>
+        <p:cNvGrpSpPr/>
+        <p:nvPr/>
+      </p:nvGrpSpPr>
+      <p:grpSpPr>
+        <a:xfrm>
+          <a:off x="0" y="0"/>
+          <a:ext cx="0" cy="0"/>
+          <a:chOff x="0" y="0"/>
+          <a:chExt cx="0" cy="0"/>
+        </a:xfrm>
+      </p:grpSpPr>
+      <p:pic>
+        <p:nvPicPr>
+          <p:cNvPr id="4" name="Picture 3">
+            <a:extLst>
+              <a:ext uri="{FF2B5EF4-FFF2-40B4-BE49-F238E27FC236}">
+                <a16:creationId xmlns:a16="http://schemas.microsoft.com/office/drawing/2014/main" id="{A9215E5E-B690-FE48-A09E-0ACEDB5BD08F}"/>
+              </a:ext>
+            </a:extLst>
+          </p:cNvPr>
+          <p:cNvPicPr>
+            <a:picLocks noChangeAspect="1"/>
+          </p:cNvPicPr>
+          <p:nvPr/>
+        </p:nvPicPr>
+        <p:blipFill rotWithShape="1">
+          <a:blip r:embed="rId2"/>
+          <a:srcRect l="28459" t="17209" r="41438" b="13954"/>
+          <a:stretch/>
+        </p:blipFill>
+        <p:spPr>
+          <a:xfrm>
+            <a:off x="1265129" y="1114816"/>
+            <a:ext cx="4273271" cy="4142012"/>
+          </a:xfrm>
+          <a:prstGeom prst="rect">
+            <a:avLst/>
+          </a:prstGeom>
+        </p:spPr>
+      </p:pic>
+      <p:grpSp>
+        <p:nvGrpSpPr>
+          <p:cNvPr id="5" name="Group 4">
+            <a:extLst>
+              <a:ext uri="{FF2B5EF4-FFF2-40B4-BE49-F238E27FC236}">
+                <a16:creationId xmlns:a16="http://schemas.microsoft.com/office/drawing/2014/main" id="{7C34E930-83C3-2141-BFCB-487BBC15C765}"/>
+              </a:ext>
+            </a:extLst>
+          </p:cNvPr>
+          <p:cNvGrpSpPr/>
+          <p:nvPr/>
+        </p:nvGrpSpPr>
+        <p:grpSpPr>
+          <a:xfrm>
+            <a:off x="8419743" y="2935517"/>
+            <a:ext cx="1160895" cy="464327"/>
+            <a:chOff x="6904094" y="4653045"/>
+            <a:chExt cx="1160895" cy="464327"/>
+          </a:xfrm>
+        </p:grpSpPr>
+        <p:sp>
+          <p:nvSpPr>
+            <p:cNvPr id="6" name="TextBox 5">
+              <a:extLst>
+                <a:ext uri="{FF2B5EF4-FFF2-40B4-BE49-F238E27FC236}">
+                  <a16:creationId xmlns:a16="http://schemas.microsoft.com/office/drawing/2014/main" id="{760AEE77-C8FC-2943-AE72-7AEADCA3D3CC}"/>
+                </a:ext>
+              </a:extLst>
+            </p:cNvPr>
+            <p:cNvSpPr txBox="1"/>
+            <p:nvPr/>
+          </p:nvSpPr>
+          <p:spPr>
+            <a:xfrm>
+              <a:off x="6904094" y="4809595"/>
+              <a:ext cx="1160895" cy="307777"/>
+            </a:xfrm>
+            <a:prstGeom prst="rect">
+              <a:avLst/>
+            </a:prstGeom>
+            <a:noFill/>
+          </p:spPr>
+          <p:txBody>
+            <a:bodyPr wrap="none" rtlCol="0">
+              <a:spAutoFit/>
+            </a:bodyPr>
+            <a:lstStyle/>
+            <a:p>
+              <a:r>
+                <a:rPr lang="en-US" sz="1400" b="1" dirty="0">
+                  <a:latin typeface="Arial" panose="020B0604020202020204" pitchFamily="34" charset="0"/>
+                  <a:cs typeface="Arial" panose="020B0604020202020204" pitchFamily="34" charset="0"/>
+                </a:rPr>
+                <a:t>SEQ170844</a:t>
+              </a:r>
+            </a:p>
+          </p:txBody>
+        </p:sp>
+        <p:sp>
+          <p:nvSpPr>
+            <p:cNvPr id="7" name="Oval 6">
+              <a:extLst>
+                <a:ext uri="{FF2B5EF4-FFF2-40B4-BE49-F238E27FC236}">
+                  <a16:creationId xmlns:a16="http://schemas.microsoft.com/office/drawing/2014/main" id="{3FBE3BA1-9E6E-DE4F-B0C1-F9E3316CC5F5}"/>
+                </a:ext>
+              </a:extLst>
+            </p:cNvPr>
+            <p:cNvSpPr/>
+            <p:nvPr/>
+          </p:nvSpPr>
+          <p:spPr>
+            <a:xfrm>
+              <a:off x="7384334" y="4653045"/>
+              <a:ext cx="100208" cy="100208"/>
+            </a:xfrm>
+            <a:prstGeom prst="ellipse">
+              <a:avLst/>
+            </a:prstGeom>
+          </p:spPr>
+          <p:style>
+            <a:lnRef idx="2">
+              <a:schemeClr val="dk1">
+                <a:shade val="50000"/>
+              </a:schemeClr>
+            </a:lnRef>
+            <a:fillRef idx="1">
+              <a:schemeClr val="dk1"/>
+            </a:fillRef>
+            <a:effectRef idx="0">
+              <a:schemeClr val="dk1"/>
+            </a:effectRef>
+            <a:fontRef idx="minor">
+              <a:schemeClr val="lt1"/>
+            </a:fontRef>
+          </p:style>
+          <p:txBody>
+            <a:bodyPr rtlCol="0" anchor="ctr"/>
+            <a:lstStyle/>
+            <a:p>
+              <a:pPr algn="ctr"/>
+              <a:endParaRPr lang="en-US">
+                <a:solidFill>
+                  <a:sysClr val="windowText" lastClr="000000"/>
+                </a:solidFill>
+              </a:endParaRPr>
+            </a:p>
+          </p:txBody>
+        </p:sp>
+      </p:grpSp>
+      <p:sp>
+        <p:nvSpPr>
+          <p:cNvPr id="8" name="TextBox 7">
+            <a:extLst>
+              <a:ext uri="{FF2B5EF4-FFF2-40B4-BE49-F238E27FC236}">
+                <a16:creationId xmlns:a16="http://schemas.microsoft.com/office/drawing/2014/main" id="{17FEFE1A-7D7B-364C-8F7B-BD6C8E93B1FA}"/>
+              </a:ext>
+            </a:extLst>
+          </p:cNvPr>
+          <p:cNvSpPr txBox="1"/>
+          <p:nvPr/>
+        </p:nvSpPr>
+        <p:spPr>
+          <a:xfrm>
+            <a:off x="2267209" y="5592008"/>
+            <a:ext cx="2249334" cy="369332"/>
+          </a:xfrm>
+          <a:prstGeom prst="rect">
+            <a:avLst/>
+          </a:prstGeom>
+          <a:noFill/>
+        </p:spPr>
+        <p:txBody>
+          <a:bodyPr wrap="none" rtlCol="0">
+            <a:spAutoFit/>
+          </a:bodyPr>
+          <a:lstStyle/>
+          <a:p>
+            <a:r>
+              <a:rPr lang="en-US" dirty="0">
+                <a:latin typeface="Helvetica" pitchFamily="2" charset="0"/>
+              </a:rPr>
+              <a:t>8 “clones” in lineage</a:t>
+            </a:r>
+          </a:p>
+        </p:txBody>
+      </p:sp>
+      <p:sp>
+        <p:nvSpPr>
+          <p:cNvPr id="9" name="TextBox 8">
+            <a:extLst>
+              <a:ext uri="{FF2B5EF4-FFF2-40B4-BE49-F238E27FC236}">
+                <a16:creationId xmlns:a16="http://schemas.microsoft.com/office/drawing/2014/main" id="{AAE0698D-32DB-8645-B1ED-F43CB01F0E1C}"/>
+              </a:ext>
+            </a:extLst>
+          </p:cNvPr>
+          <p:cNvSpPr txBox="1"/>
+          <p:nvPr/>
+        </p:nvSpPr>
+        <p:spPr>
+          <a:xfrm>
+            <a:off x="8024290" y="3859250"/>
+            <a:ext cx="2650168" cy="923330"/>
+          </a:xfrm>
+          <a:prstGeom prst="rect">
+            <a:avLst/>
+          </a:prstGeom>
+          <a:noFill/>
+        </p:spPr>
+        <p:txBody>
+          <a:bodyPr wrap="square" rtlCol="0">
+            <a:spAutoFit/>
+          </a:bodyPr>
+          <a:lstStyle/>
+          <a:p>
+            <a:r>
+              <a:rPr lang="en-US" dirty="0" err="1">
+                <a:latin typeface="Helvetica" pitchFamily="2" charset="0"/>
+              </a:rPr>
+              <a:t>ErrorX</a:t>
+            </a:r>
+            <a:r>
+              <a:rPr lang="en-US" dirty="0">
+                <a:latin typeface="Helvetica" pitchFamily="2" charset="0"/>
+              </a:rPr>
+              <a:t> collapses false clones into one consensus sequence</a:t>
+            </a:r>
+          </a:p>
+        </p:txBody>
+      </p:sp>
+      <p:sp>
+        <p:nvSpPr>
+          <p:cNvPr id="13" name="Title 1">
+            <a:extLst>
+              <a:ext uri="{FF2B5EF4-FFF2-40B4-BE49-F238E27FC236}">
+                <a16:creationId xmlns:a16="http://schemas.microsoft.com/office/drawing/2014/main" id="{9E950A04-3874-3C41-B3AE-360A606537D9}"/>
+              </a:ext>
+            </a:extLst>
+          </p:cNvPr>
+          <p:cNvSpPr>
+            <a:spLocks noGrp="1"/>
+          </p:cNvSpPr>
+          <p:nvPr>
+            <p:ph type="title"/>
+          </p:nvPr>
+        </p:nvSpPr>
+        <p:spPr>
+          <a:xfrm>
+            <a:off x="599164" y="438621"/>
+            <a:ext cx="11338140" cy="676195"/>
+          </a:xfrm>
+        </p:spPr>
+        <p:txBody>
+          <a:bodyPr anchor="ctr">
+            <a:noAutofit/>
+          </a:bodyPr>
+          <a:lstStyle/>
+          <a:p>
+            <a:r>
+              <a:rPr lang="en-US" sz="3200" dirty="0" err="1">
+                <a:latin typeface="Helvetica" pitchFamily="2" charset="0"/>
+              </a:rPr>
+              <a:t>ErrorX</a:t>
+            </a:r>
+            <a:r>
+              <a:rPr lang="en-US" sz="3200" dirty="0">
+                <a:latin typeface="Helvetica" pitchFamily="2" charset="0"/>
+              </a:rPr>
+              <a:t> eliminates false clonal lineages in antibody repertoire</a:t>
+            </a:r>
+          </a:p>
+        </p:txBody>
+      </p:sp>
+    </p:spTree>
+    <p:extLst>
+      <p:ext uri="{BB962C8B-B14F-4D97-AF65-F5344CB8AC3E}">
+        <p14:creationId xmlns:p14="http://schemas.microsoft.com/office/powerpoint/2010/main" val="1810626883"/>
+      </p:ext>
+    </p:extLst>
+  </p:cSld>
+  <p:clrMapOvr>
+    <a:masterClrMapping/>
+  </p:clrMapOvr>
+</p:sld>
+</file>
+
+<file path=ppt/slides/slide3.xml><?xml version="1.0" encoding="utf-8"?>
+<p:sld xmlns:a="http://schemas.openxmlformats.org/drawingml/2006/main" xmlns:r="http://schemas.openxmlformats.org/officeDocument/2006/relationships" xmlns:p="http://schemas.openxmlformats.org/presentationml/2006/main">
+  <p:cSld>
+    <p:spTree>
+      <p:nvGrpSpPr>
+        <p:cNvPr id="1" name=""/>
+        <p:cNvGrpSpPr/>
+        <p:nvPr/>
+      </p:nvGrpSpPr>
+      <p:grpSpPr>
+        <a:xfrm>
+          <a:off x="0" y="0"/>
+          <a:ext cx="0" cy="0"/>
+          <a:chOff x="0" y="0"/>
+          <a:chExt cx="0" cy="0"/>
+        </a:xfrm>
+      </p:grpSpPr>
+      <p:pic>
+        <p:nvPicPr>
+          <p:cNvPr id="4" name="Picture 3">
+            <a:extLst>
+              <a:ext uri="{FF2B5EF4-FFF2-40B4-BE49-F238E27FC236}">
+                <a16:creationId xmlns:a16="http://schemas.microsoft.com/office/drawing/2014/main" id="{3FC15D55-0A31-3249-BC9F-3198F383EA5A}"/>
+              </a:ext>
+            </a:extLst>
+          </p:cNvPr>
+          <p:cNvPicPr>
+            <a:picLocks noChangeAspect="1"/>
+          </p:cNvPicPr>
+          <p:nvPr/>
+        </p:nvPicPr>
+        <p:blipFill rotWithShape="1">
+          <a:blip r:embed="rId2"/>
+          <a:srcRect r="21689"/>
+          <a:stretch/>
+        </p:blipFill>
+        <p:spPr>
+          <a:xfrm>
+            <a:off x="2957014" y="1309929"/>
+            <a:ext cx="7060211" cy="2330972"/>
+          </a:xfrm>
+          <a:prstGeom prst="rect">
+            <a:avLst/>
+          </a:prstGeom>
+        </p:spPr>
+      </p:pic>
+      <p:pic>
+        <p:nvPicPr>
+          <p:cNvPr id="5" name="Picture 4">
+            <a:extLst>
+              <a:ext uri="{FF2B5EF4-FFF2-40B4-BE49-F238E27FC236}">
+                <a16:creationId xmlns:a16="http://schemas.microsoft.com/office/drawing/2014/main" id="{440000AD-C517-144E-B7B1-F2833132D545}"/>
+              </a:ext>
+            </a:extLst>
+          </p:cNvPr>
+          <p:cNvPicPr>
+            <a:picLocks noChangeAspect="1"/>
+          </p:cNvPicPr>
+          <p:nvPr/>
+        </p:nvPicPr>
+        <p:blipFill rotWithShape="1">
+          <a:blip r:embed="rId3"/>
+          <a:srcRect t="24059" r="22172"/>
+          <a:stretch/>
+        </p:blipFill>
+        <p:spPr>
+          <a:xfrm>
+            <a:off x="2754884" y="3538603"/>
+            <a:ext cx="7339210" cy="2176873"/>
+          </a:xfrm>
+          <a:prstGeom prst="rect">
+            <a:avLst/>
+          </a:prstGeom>
+        </p:spPr>
+      </p:pic>
+      <p:sp>
+        <p:nvSpPr>
+          <p:cNvPr id="6" name="TextBox 5">
+            <a:extLst>
+              <a:ext uri="{FF2B5EF4-FFF2-40B4-BE49-F238E27FC236}">
+                <a16:creationId xmlns:a16="http://schemas.microsoft.com/office/drawing/2014/main" id="{B1FF236D-A308-1840-9D56-F83F304D33E3}"/>
+              </a:ext>
+            </a:extLst>
+          </p:cNvPr>
+          <p:cNvSpPr txBox="1"/>
+          <p:nvPr/>
+        </p:nvSpPr>
+        <p:spPr>
+          <a:xfrm>
+            <a:off x="8022768" y="5837371"/>
+            <a:ext cx="1915909" cy="307777"/>
+          </a:xfrm>
+          <a:prstGeom prst="rect">
+            <a:avLst/>
+          </a:prstGeom>
+          <a:noFill/>
+        </p:spPr>
+        <p:txBody>
+          <a:bodyPr wrap="none" rtlCol="0">
+            <a:spAutoFit/>
+          </a:bodyPr>
+          <a:lstStyle/>
+          <a:p>
+            <a:r>
+              <a:rPr lang="en-US" sz="1400" b="1" dirty="0">
+                <a:solidFill>
+                  <a:srgbClr val="FF6666"/>
+                </a:solidFill>
+                <a:highlight>
+                  <a:srgbClr val="FF6666"/>
+                </a:highlight>
+                <a:latin typeface="Helvetica" pitchFamily="2" charset="0"/>
+              </a:rPr>
+              <a:t>__</a:t>
+            </a:r>
+            <a:r>
+              <a:rPr lang="en-US" sz="1400" b="1" dirty="0">
+                <a:latin typeface="Helvetica" pitchFamily="2" charset="0"/>
+              </a:rPr>
+              <a:t> Sequencing error</a:t>
+            </a:r>
+          </a:p>
+        </p:txBody>
+      </p:sp>
+      <p:sp>
+        <p:nvSpPr>
+          <p:cNvPr id="7" name="TextBox 6">
+            <a:extLst>
+              <a:ext uri="{FF2B5EF4-FFF2-40B4-BE49-F238E27FC236}">
+                <a16:creationId xmlns:a16="http://schemas.microsoft.com/office/drawing/2014/main" id="{024A0B7E-2BAD-F745-A9A0-1A8EDEA11852}"/>
+              </a:ext>
+            </a:extLst>
+          </p:cNvPr>
+          <p:cNvSpPr txBox="1"/>
+          <p:nvPr/>
+        </p:nvSpPr>
+        <p:spPr>
+          <a:xfrm>
+            <a:off x="777463" y="2106083"/>
+            <a:ext cx="2108269" cy="369332"/>
+          </a:xfrm>
+          <a:prstGeom prst="rect">
+            <a:avLst/>
+          </a:prstGeom>
+          <a:noFill/>
+        </p:spPr>
+        <p:txBody>
+          <a:bodyPr wrap="none" rtlCol="0">
+            <a:spAutoFit/>
+          </a:bodyPr>
+          <a:lstStyle/>
+          <a:p>
+            <a:r>
+              <a:rPr lang="en-US" b="1" dirty="0">
+                <a:latin typeface="Helvetica" pitchFamily="2" charset="0"/>
+              </a:rPr>
+              <a:t>Before correction</a:t>
+            </a:r>
+          </a:p>
+        </p:txBody>
+      </p:sp>
+      <p:sp>
+        <p:nvSpPr>
+          <p:cNvPr id="8" name="TextBox 7">
+            <a:extLst>
+              <a:ext uri="{FF2B5EF4-FFF2-40B4-BE49-F238E27FC236}">
+                <a16:creationId xmlns:a16="http://schemas.microsoft.com/office/drawing/2014/main" id="{83E62D46-BBA8-2A4C-A227-27B99BA281AE}"/>
+              </a:ext>
+            </a:extLst>
+          </p:cNvPr>
+          <p:cNvSpPr txBox="1"/>
+          <p:nvPr/>
+        </p:nvSpPr>
+        <p:spPr>
+          <a:xfrm>
+            <a:off x="969823" y="4334757"/>
+            <a:ext cx="1915909" cy="369332"/>
+          </a:xfrm>
+          <a:prstGeom prst="rect">
+            <a:avLst/>
+          </a:prstGeom>
+          <a:noFill/>
+        </p:spPr>
+        <p:txBody>
+          <a:bodyPr wrap="none" rtlCol="0">
+            <a:spAutoFit/>
+          </a:bodyPr>
+          <a:lstStyle/>
+          <a:p>
+            <a:r>
+              <a:rPr lang="en-US" b="1" dirty="0">
+                <a:latin typeface="Helvetica" pitchFamily="2" charset="0"/>
+              </a:rPr>
+              <a:t>After correction</a:t>
+            </a:r>
+          </a:p>
+        </p:txBody>
+      </p:sp>
+      <p:sp>
+        <p:nvSpPr>
+          <p:cNvPr id="9" name="TextBox 8">
+            <a:extLst>
+              <a:ext uri="{FF2B5EF4-FFF2-40B4-BE49-F238E27FC236}">
+                <a16:creationId xmlns:a16="http://schemas.microsoft.com/office/drawing/2014/main" id="{AE75FDCF-A383-BB49-A32B-20D41CF91093}"/>
+              </a:ext>
+            </a:extLst>
+          </p:cNvPr>
+          <p:cNvSpPr txBox="1"/>
+          <p:nvPr/>
+        </p:nvSpPr>
+        <p:spPr>
+          <a:xfrm>
+            <a:off x="8022768" y="6113154"/>
+            <a:ext cx="2810385" cy="307777"/>
+          </a:xfrm>
+          <a:prstGeom prst="rect">
+            <a:avLst/>
+          </a:prstGeom>
+          <a:noFill/>
+        </p:spPr>
+        <p:txBody>
+          <a:bodyPr wrap="none" rtlCol="0">
+            <a:spAutoFit/>
+          </a:bodyPr>
+          <a:lstStyle/>
+          <a:p>
+            <a:r>
+              <a:rPr lang="en-US" sz="1400" b="1" dirty="0">
+                <a:latin typeface="Helvetica" pitchFamily="2" charset="0"/>
+              </a:rPr>
+              <a:t>N=predicted as error by </a:t>
+            </a:r>
+            <a:r>
+              <a:rPr lang="en-US" sz="1400" b="1" dirty="0" err="1">
+                <a:latin typeface="Helvetica" pitchFamily="2" charset="0"/>
+              </a:rPr>
+              <a:t>ErrorX</a:t>
+            </a:r>
+            <a:endParaRPr lang="en-US" sz="1400" b="1" dirty="0">
+              <a:latin typeface="Helvetica" pitchFamily="2" charset="0"/>
+            </a:endParaRPr>
+          </a:p>
+        </p:txBody>
+      </p:sp>
+      <p:sp>
+        <p:nvSpPr>
+          <p:cNvPr id="10" name="Title 1">
+            <a:extLst>
+              <a:ext uri="{FF2B5EF4-FFF2-40B4-BE49-F238E27FC236}">
+                <a16:creationId xmlns:a16="http://schemas.microsoft.com/office/drawing/2014/main" id="{CB47EF45-743F-0942-893A-7BD1CE1DDEFD}"/>
+              </a:ext>
+            </a:extLst>
+          </p:cNvPr>
+          <p:cNvSpPr>
+            <a:spLocks noGrp="1"/>
+          </p:cNvSpPr>
+          <p:nvPr>
+            <p:ph type="title"/>
+          </p:nvPr>
+        </p:nvSpPr>
+        <p:spPr>
+          <a:xfrm>
+            <a:off x="599164" y="438621"/>
+            <a:ext cx="11592836" cy="676195"/>
+          </a:xfrm>
+        </p:spPr>
+        <p:txBody>
+          <a:bodyPr anchor="ctr">
+            <a:noAutofit/>
+          </a:bodyPr>
+          <a:lstStyle/>
+          <a:p>
+            <a:r>
+              <a:rPr lang="en-US" sz="3200" dirty="0" err="1">
+                <a:latin typeface="Helvetica" pitchFamily="2" charset="0"/>
+              </a:rPr>
+              <a:t>ErrorX</a:t>
+            </a:r>
+            <a:r>
+              <a:rPr lang="en-US" sz="3200" dirty="0">
+                <a:latin typeface="Helvetica" pitchFamily="2" charset="0"/>
+              </a:rPr>
+              <a:t> eliminates false clonal lineages in antibody repertoire</a:t>
+            </a:r>
+          </a:p>
+        </p:txBody>
+      </p:sp>
+    </p:spTree>
+    <p:extLst>
+      <p:ext uri="{BB962C8B-B14F-4D97-AF65-F5344CB8AC3E}">
+        <p14:creationId xmlns:p14="http://schemas.microsoft.com/office/powerpoint/2010/main" val="2798755857"/>
       </p:ext>
     </p:extLst>
   </p:cSld>

</xml_diff>